<commit_message>
minor change in presentation
</commit_message>
<xml_diff>
--- a/Project/Presentation/Data Science Project – First Presentation.pptx
+++ b/Project/Presentation/Data Science Project – First Presentation.pptx
@@ -6017,18 +6017,7 @@
                   </a:schemeClr>
                 </a:solidFill>
               </a:rPr>
-              <a:t>Data </a:t>
-            </a:r>
-            <a:r>
-              <a:rPr lang="en-US" sz="2400" b="1" dirty="0" smtClean="0">
-                <a:solidFill>
-                  <a:schemeClr val="tx1">
-                    <a:lumMod val="50000"/>
-                    <a:lumOff val="50000"/>
-                  </a:schemeClr>
-                </a:solidFill>
-              </a:rPr>
-              <a:t>set snapshot</a:t>
+              <a:t>Data set snapshot</a:t>
             </a:r>
             <a:endParaRPr lang="en-GB" sz="2400" b="1" dirty="0" smtClean="0">
               <a:solidFill>
@@ -6088,7 +6077,12 @@
             <p:ph idx="1"/>
           </p:nvPr>
         </p:nvSpPr>
-        <p:spPr/>
+        <p:spPr>
+          <a:xfrm>
+            <a:off x="391887" y="1487927"/>
+            <a:ext cx="8356826" cy="4871930"/>
+          </a:xfrm>
+        </p:spPr>
         <p:txBody>
           <a:bodyPr/>
           <a:lstStyle/>
@@ -6103,8 +6097,99 @@
             </a:r>
             <a:r>
               <a:rPr lang="en-US" dirty="0" smtClean="0"/>
-              <a:t> link </a:t>
-            </a:r>
+              <a:t> </a:t>
+            </a:r>
+            <a:r>
+              <a:rPr lang="en-US" dirty="0" smtClean="0"/>
+              <a:t>link</a:t>
+            </a:r>
+          </a:p>
+          <a:p>
+            <a:pPr marL="0" indent="0">
+              <a:buNone/>
+            </a:pPr>
+            <a:r>
+              <a:rPr lang="en-US" dirty="0">
+                <a:hlinkClick r:id="rId2"/>
+              </a:rPr>
+              <a:t>https://</a:t>
+            </a:r>
+            <a:r>
+              <a:rPr lang="en-US" dirty="0" smtClean="0">
+                <a:hlinkClick r:id="rId2"/>
+              </a:rPr>
+              <a:t>github.com/Ameyadeolalkar/Data-science-course-projects-and-homeworks/tree/master/Project</a:t>
+            </a:r>
+            <a:endParaRPr lang="en-US" dirty="0" smtClean="0"/>
+          </a:p>
+          <a:p>
+            <a:pPr marL="0" indent="0">
+              <a:buNone/>
+            </a:pPr>
+            <a:endParaRPr lang="en-US" dirty="0" smtClean="0"/>
+          </a:p>
+          <a:p>
+            <a:r>
+              <a:rPr lang="en-US" dirty="0" smtClean="0"/>
+              <a:t>Data files</a:t>
+            </a:r>
+          </a:p>
+          <a:p>
+            <a:pPr marL="0" indent="0">
+              <a:buNone/>
+            </a:pPr>
+            <a:r>
+              <a:rPr lang="en-US" dirty="0">
+                <a:hlinkClick r:id="rId3"/>
+              </a:rPr>
+              <a:t>https://</a:t>
+            </a:r>
+            <a:r>
+              <a:rPr lang="en-US" dirty="0" smtClean="0">
+                <a:hlinkClick r:id="rId3"/>
+              </a:rPr>
+              <a:t>github.com/Ameyadeolalkar/Data-science-course-projects-and-homeworks/tree/master/Project/csv_files</a:t>
+            </a:r>
+            <a:endParaRPr lang="en-US" dirty="0" smtClean="0"/>
+          </a:p>
+          <a:p>
+            <a:pPr marL="0" indent="0">
+              <a:buNone/>
+            </a:pPr>
+            <a:endParaRPr lang="en-US" dirty="0"/>
+          </a:p>
+          <a:p>
+            <a:r>
+              <a:rPr lang="en-US" dirty="0" smtClean="0"/>
+              <a:t>Code</a:t>
+            </a:r>
+          </a:p>
+          <a:p>
+            <a:pPr marL="0" indent="0">
+              <a:buNone/>
+            </a:pPr>
+            <a:r>
+              <a:rPr lang="en-US" dirty="0">
+                <a:hlinkClick r:id="rId4"/>
+              </a:rPr>
+              <a:t>https://</a:t>
+            </a:r>
+            <a:r>
+              <a:rPr lang="en-US" dirty="0" smtClean="0">
+                <a:hlinkClick r:id="rId4"/>
+              </a:rPr>
+              <a:t>github.com/Ameyadeolalkar/Data-science-course-projects-and-homeworks/tree/master/Project/Code</a:t>
+            </a:r>
+            <a:r>
+              <a:rPr lang="en-US" dirty="0" smtClean="0"/>
+              <a:t>  </a:t>
+            </a:r>
+          </a:p>
+          <a:p>
+            <a:pPr marL="0" indent="0">
+              <a:buNone/>
+            </a:pPr>
+            <a:endParaRPr lang="en-US" dirty="0" smtClean="0"/>
           </a:p>
           <a:p>
             <a:pPr marL="0" indent="0">

</xml_diff>